<commit_message>
uploaded the Eda, and ppt
</commit_message>
<xml_diff>
--- a/Shipment Delay Analysis Overview.pptx
+++ b/Shipment Delay Analysis Overview.pptx
@@ -11,16 +11,10 @@
     <p:sldId id="270" r:id="rId5"/>
     <p:sldId id="269" r:id="rId6"/>
     <p:sldId id="271" r:id="rId7"/>
-    <p:sldId id="268" r:id="rId8"/>
-    <p:sldId id="267" r:id="rId9"/>
+    <p:sldId id="272" r:id="rId8"/>
+    <p:sldId id="268" r:id="rId9"/>
     <p:sldId id="266" r:id="rId10"/>
     <p:sldId id="265" r:id="rId11"/>
-    <p:sldId id="264" r:id="rId12"/>
-    <p:sldId id="263" r:id="rId13"/>
-    <p:sldId id="262" r:id="rId14"/>
-    <p:sldId id="261" r:id="rId15"/>
-    <p:sldId id="259" r:id="rId16"/>
-    <p:sldId id="260" r:id="rId17"/>
   </p:sldIdLst>
   <p:sldSz cx="12192000" cy="6858000"/>
   <p:notesSz cx="6858000" cy="9144000"/>
@@ -3373,7 +3367,12 @@
             <p:ph type="ctrTitle"/>
           </p:nvPr>
         </p:nvSpPr>
-        <p:spPr/>
+        <p:spPr>
+          <a:xfrm>
+            <a:off x="1410749" y="1680231"/>
+            <a:ext cx="9144000" cy="2387600"/>
+          </a:xfrm>
+        </p:spPr>
         <p:txBody>
           <a:bodyPr/>
           <a:lstStyle/>
@@ -3431,7 +3430,12 @@
             <p:ph type="title"/>
           </p:nvPr>
         </p:nvSpPr>
-        <p:spPr/>
+        <p:spPr>
+          <a:xfrm>
+            <a:off x="50334" y="130233"/>
+            <a:ext cx="11240549" cy="1325563"/>
+          </a:xfrm>
+        </p:spPr>
         <p:txBody>
           <a:bodyPr>
             <a:normAutofit fontScale="90000"/>
@@ -3439,7 +3443,7 @@
           <a:lstStyle/>
           <a:p>
             <a:r>
-              <a:rPr lang="en-GB" dirty="0"/>
+              <a:rPr lang="en-GB" sz="4000" dirty="0"/>
               <a:t>Proposed Timeline for Implementing Recommendations</a:t>
             </a:r>
             <a:br>
@@ -3467,13 +3471,13 @@
         </p:nvSpPr>
         <p:spPr>
           <a:xfrm>
-            <a:off x="838200" y="1539380"/>
-            <a:ext cx="10515600" cy="4637583"/>
+            <a:off x="158690" y="1283516"/>
+            <a:ext cx="11690760" cy="5079534"/>
           </a:xfrm>
         </p:spPr>
         <p:txBody>
           <a:bodyPr>
-            <a:normAutofit fontScale="92500" lnSpcReduction="20000"/>
+            <a:normAutofit fontScale="92500" lnSpcReduction="10000"/>
           </a:bodyPr>
           <a:lstStyle/>
           <a:p>
@@ -3487,13 +3491,20 @@
             </a:r>
           </a:p>
           <a:p>
+            <a:pPr lvl="1"/>
+            <a:r>
+              <a:rPr lang="en-GB" dirty="0"/>
+              <a:t>Conduct initial data audit to identify existing data gaps (Traffic congestion, Weather conditions, Route distance and complexity, Vehicle-related issues).</a:t>
+            </a:r>
+          </a:p>
+          <a:p>
             <a:pPr marL="742950" lvl="1" indent="-285750" algn="l">
               <a:buFont typeface="Arial" panose="020B0604020202020204" pitchFamily="34" charset="0"/>
               <a:buChar char="•"/>
             </a:pPr>
             <a:r>
               <a:rPr lang="en-GB" dirty="0"/>
-              <a:t>Conduct initial data audit to identify existing data gaps.</a:t>
+              <a:t>Begin strategies to collect additional data types, such as traffic and weather data from different APIs.</a:t>
             </a:r>
           </a:p>
           <a:p>
@@ -3503,7 +3514,17 @@
             </a:pPr>
             <a:r>
               <a:rPr lang="en-GB" dirty="0"/>
-              <a:t>Begin strategies to collect additional data types, such as traffic and weather data from different APIs.</a:t>
+              <a:t>Implement basic enhancements to the predictive model using additional historical data.</a:t>
+            </a:r>
+          </a:p>
+          <a:p>
+            <a:pPr algn="l">
+              <a:buFont typeface="Arial" panose="020B0604020202020204" pitchFamily="34" charset="0"/>
+              <a:buChar char="•"/>
+            </a:pPr>
+            <a:r>
+              <a:rPr lang="en-GB" dirty="0"/>
+              <a:t>Medium-Term (4-6 Months):</a:t>
             </a:r>
           </a:p>
           <a:p>
@@ -3513,7 +3534,27 @@
             </a:pPr>
             <a:r>
               <a:rPr lang="en-GB" dirty="0"/>
-              <a:t>Implement basic enhancements to the predictive model using additional historical data.</a:t>
+              <a:t>Develop and test advanced predictive models incorporating real-time data feeds.</a:t>
+            </a:r>
+          </a:p>
+          <a:p>
+            <a:pPr marL="742950" lvl="1" indent="-285750" algn="l">
+              <a:buFont typeface="Arial" panose="020B0604020202020204" pitchFamily="34" charset="0"/>
+              <a:buChar char="•"/>
+            </a:pPr>
+            <a:r>
+              <a:rPr lang="en-GB" dirty="0"/>
+              <a:t>Start route optimization experiments based on predictive outputs.</a:t>
+            </a:r>
+          </a:p>
+          <a:p>
+            <a:pPr marL="742950" lvl="1" indent="-285750" algn="l">
+              <a:buFont typeface="Arial" panose="020B0604020202020204" pitchFamily="34" charset="0"/>
+              <a:buChar char="•"/>
+            </a:pPr>
+            <a:r>
+              <a:rPr lang="en-GB" dirty="0"/>
+              <a:t>Collect and analyse initial feedback from enhanced tracking systems.</a:t>
             </a:r>
           </a:p>
           <a:p>
@@ -3523,7 +3564,7 @@
             </a:pPr>
             <a:r>
               <a:rPr lang="en-GB" dirty="0"/>
-              <a:t>Medium-Term (4-6 Months):</a:t>
+              <a:t>Long-Term (6-12 Months):</a:t>
             </a:r>
           </a:p>
           <a:p>
@@ -3533,7 +3574,7 @@
             </a:pPr>
             <a:r>
               <a:rPr lang="en-GB" dirty="0"/>
-              <a:t>Develop and test advanced predictive models incorporating real-time data feeds.</a:t>
+              <a:t>Fully integrate advanced predictive analytics into daily operations.</a:t>
             </a:r>
           </a:p>
           <a:p>
@@ -3543,7 +3584,7 @@
             </a:pPr>
             <a:r>
               <a:rPr lang="en-GB" dirty="0"/>
-              <a:t>Start route optimization experiments based on predictive outputs.</a:t>
+              <a:t>Evaluate the effectiveness of route optimization and adjust as necessary.</a:t>
             </a:r>
           </a:p>
           <a:p>
@@ -3553,46 +3594,6 @@
             </a:pPr>
             <a:r>
               <a:rPr lang="en-GB" dirty="0"/>
-              <a:t>Collect and analyse initial feedback from enhanced tracking systems.</a:t>
-            </a:r>
-          </a:p>
-          <a:p>
-            <a:pPr algn="l">
-              <a:buFont typeface="Arial" panose="020B0604020202020204" pitchFamily="34" charset="0"/>
-              <a:buChar char="•"/>
-            </a:pPr>
-            <a:r>
-              <a:rPr lang="en-GB" dirty="0"/>
-              <a:t>Long-Term (6-12 Months):</a:t>
-            </a:r>
-          </a:p>
-          <a:p>
-            <a:pPr marL="742950" lvl="1" indent="-285750" algn="l">
-              <a:buFont typeface="Arial" panose="020B0604020202020204" pitchFamily="34" charset="0"/>
-              <a:buChar char="•"/>
-            </a:pPr>
-            <a:r>
-              <a:rPr lang="en-GB" dirty="0"/>
-              <a:t>Fully integrate advanced predictive analytics into daily operations.</a:t>
-            </a:r>
-          </a:p>
-          <a:p>
-            <a:pPr marL="742950" lvl="1" indent="-285750" algn="l">
-              <a:buFont typeface="Arial" panose="020B0604020202020204" pitchFamily="34" charset="0"/>
-              <a:buChar char="•"/>
-            </a:pPr>
-            <a:r>
-              <a:rPr lang="en-GB" dirty="0"/>
-              <a:t>Evaluate the effectiveness of route optimization and adjust as necessary.</a:t>
-            </a:r>
-          </a:p>
-          <a:p>
-            <a:pPr marL="742950" lvl="1" indent="-285750" algn="l">
-              <a:buFont typeface="Arial" panose="020B0604020202020204" pitchFamily="34" charset="0"/>
-              <a:buChar char="•"/>
-            </a:pPr>
-            <a:r>
-              <a:rPr lang="en-GB" dirty="0"/>
               <a:t>Review and refine the predictive model based on new data and feedback.</a:t>
             </a:r>
           </a:p>
@@ -3605,486 +3606,6 @@
     <p:extLst>
       <p:ext uri="{BB962C8B-B14F-4D97-AF65-F5344CB8AC3E}">
         <p14:creationId xmlns:p14="http://schemas.microsoft.com/office/powerpoint/2010/main" val="3122824602"/>
-      </p:ext>
-    </p:extLst>
-  </p:cSld>
-  <p:clrMapOvr>
-    <a:masterClrMapping/>
-  </p:clrMapOvr>
-</p:sld>
-</file>
-
-<file path=ppt/slides/slide11.xml><?xml version="1.0" encoding="utf-8"?>
-<p:sld xmlns:a="http://schemas.openxmlformats.org/drawingml/2006/main" xmlns:r="http://schemas.openxmlformats.org/officeDocument/2006/relationships" xmlns:p="http://schemas.openxmlformats.org/presentationml/2006/main">
-  <p:cSld>
-    <p:spTree>
-      <p:nvGrpSpPr>
-        <p:cNvPr id="1" name=""/>
-        <p:cNvGrpSpPr/>
-        <p:nvPr/>
-      </p:nvGrpSpPr>
-      <p:grpSpPr>
-        <a:xfrm>
-          <a:off x="0" y="0"/>
-          <a:ext cx="0" cy="0"/>
-          <a:chOff x="0" y="0"/>
-          <a:chExt cx="0" cy="0"/>
-        </a:xfrm>
-      </p:grpSpPr>
-      <p:sp>
-        <p:nvSpPr>
-          <p:cNvPr id="2" name="Title 1">
-            <a:extLst>
-              <a:ext uri="{FF2B5EF4-FFF2-40B4-BE49-F238E27FC236}">
-                <a16:creationId xmlns:a16="http://schemas.microsoft.com/office/drawing/2014/main" id="{220ADD1B-696A-4F69-AB8C-80490ABC4F64}"/>
-              </a:ext>
-            </a:extLst>
-          </p:cNvPr>
-          <p:cNvSpPr>
-            <a:spLocks noGrp="1"/>
-          </p:cNvSpPr>
-          <p:nvPr>
-            <p:ph type="title"/>
-          </p:nvPr>
-        </p:nvSpPr>
-        <p:spPr/>
-        <p:txBody>
-          <a:bodyPr/>
-          <a:lstStyle/>
-          <a:p>
-            <a:endParaRPr lang="en-GB"/>
-          </a:p>
-        </p:txBody>
-      </p:sp>
-      <p:sp>
-        <p:nvSpPr>
-          <p:cNvPr id="3" name="Content Placeholder 2">
-            <a:extLst>
-              <a:ext uri="{FF2B5EF4-FFF2-40B4-BE49-F238E27FC236}">
-                <a16:creationId xmlns:a16="http://schemas.microsoft.com/office/drawing/2014/main" id="{AE537EC5-DEB0-63E8-7F36-B5E9E8F192D6}"/>
-              </a:ext>
-            </a:extLst>
-          </p:cNvPr>
-          <p:cNvSpPr>
-            <a:spLocks noGrp="1"/>
-          </p:cNvSpPr>
-          <p:nvPr>
-            <p:ph idx="1"/>
-          </p:nvPr>
-        </p:nvSpPr>
-        <p:spPr/>
-        <p:txBody>
-          <a:bodyPr/>
-          <a:lstStyle/>
-          <a:p>
-            <a:endParaRPr lang="en-GB"/>
-          </a:p>
-        </p:txBody>
-      </p:sp>
-    </p:spTree>
-    <p:extLst>
-      <p:ext uri="{BB962C8B-B14F-4D97-AF65-F5344CB8AC3E}">
-        <p14:creationId xmlns:p14="http://schemas.microsoft.com/office/powerpoint/2010/main" val="3314688458"/>
-      </p:ext>
-    </p:extLst>
-  </p:cSld>
-  <p:clrMapOvr>
-    <a:masterClrMapping/>
-  </p:clrMapOvr>
-</p:sld>
-</file>
-
-<file path=ppt/slides/slide12.xml><?xml version="1.0" encoding="utf-8"?>
-<p:sld xmlns:a="http://schemas.openxmlformats.org/drawingml/2006/main" xmlns:r="http://schemas.openxmlformats.org/officeDocument/2006/relationships" xmlns:p="http://schemas.openxmlformats.org/presentationml/2006/main">
-  <p:cSld>
-    <p:spTree>
-      <p:nvGrpSpPr>
-        <p:cNvPr id="1" name=""/>
-        <p:cNvGrpSpPr/>
-        <p:nvPr/>
-      </p:nvGrpSpPr>
-      <p:grpSpPr>
-        <a:xfrm>
-          <a:off x="0" y="0"/>
-          <a:ext cx="0" cy="0"/>
-          <a:chOff x="0" y="0"/>
-          <a:chExt cx="0" cy="0"/>
-        </a:xfrm>
-      </p:grpSpPr>
-      <p:sp>
-        <p:nvSpPr>
-          <p:cNvPr id="2" name="Title 1">
-            <a:extLst>
-              <a:ext uri="{FF2B5EF4-FFF2-40B4-BE49-F238E27FC236}">
-                <a16:creationId xmlns:a16="http://schemas.microsoft.com/office/drawing/2014/main" id="{F1221649-88C5-516A-21EA-A9CE8CBA509F}"/>
-              </a:ext>
-            </a:extLst>
-          </p:cNvPr>
-          <p:cNvSpPr>
-            <a:spLocks noGrp="1"/>
-          </p:cNvSpPr>
-          <p:nvPr>
-            <p:ph type="title"/>
-          </p:nvPr>
-        </p:nvSpPr>
-        <p:spPr/>
-        <p:txBody>
-          <a:bodyPr/>
-          <a:lstStyle/>
-          <a:p>
-            <a:endParaRPr lang="en-GB"/>
-          </a:p>
-        </p:txBody>
-      </p:sp>
-      <p:sp>
-        <p:nvSpPr>
-          <p:cNvPr id="3" name="Content Placeholder 2">
-            <a:extLst>
-              <a:ext uri="{FF2B5EF4-FFF2-40B4-BE49-F238E27FC236}">
-                <a16:creationId xmlns:a16="http://schemas.microsoft.com/office/drawing/2014/main" id="{67B07F21-1928-49A5-3161-738A3E7AB15E}"/>
-              </a:ext>
-            </a:extLst>
-          </p:cNvPr>
-          <p:cNvSpPr>
-            <a:spLocks noGrp="1"/>
-          </p:cNvSpPr>
-          <p:nvPr>
-            <p:ph idx="1"/>
-          </p:nvPr>
-        </p:nvSpPr>
-        <p:spPr/>
-        <p:txBody>
-          <a:bodyPr/>
-          <a:lstStyle/>
-          <a:p>
-            <a:endParaRPr lang="en-GB"/>
-          </a:p>
-        </p:txBody>
-      </p:sp>
-    </p:spTree>
-    <p:extLst>
-      <p:ext uri="{BB962C8B-B14F-4D97-AF65-F5344CB8AC3E}">
-        <p14:creationId xmlns:p14="http://schemas.microsoft.com/office/powerpoint/2010/main" val="1863688388"/>
-      </p:ext>
-    </p:extLst>
-  </p:cSld>
-  <p:clrMapOvr>
-    <a:masterClrMapping/>
-  </p:clrMapOvr>
-</p:sld>
-</file>
-
-<file path=ppt/slides/slide13.xml><?xml version="1.0" encoding="utf-8"?>
-<p:sld xmlns:a="http://schemas.openxmlformats.org/drawingml/2006/main" xmlns:r="http://schemas.openxmlformats.org/officeDocument/2006/relationships" xmlns:p="http://schemas.openxmlformats.org/presentationml/2006/main">
-  <p:cSld>
-    <p:spTree>
-      <p:nvGrpSpPr>
-        <p:cNvPr id="1" name=""/>
-        <p:cNvGrpSpPr/>
-        <p:nvPr/>
-      </p:nvGrpSpPr>
-      <p:grpSpPr>
-        <a:xfrm>
-          <a:off x="0" y="0"/>
-          <a:ext cx="0" cy="0"/>
-          <a:chOff x="0" y="0"/>
-          <a:chExt cx="0" cy="0"/>
-        </a:xfrm>
-      </p:grpSpPr>
-      <p:sp>
-        <p:nvSpPr>
-          <p:cNvPr id="2" name="Title 1">
-            <a:extLst>
-              <a:ext uri="{FF2B5EF4-FFF2-40B4-BE49-F238E27FC236}">
-                <a16:creationId xmlns:a16="http://schemas.microsoft.com/office/drawing/2014/main" id="{7AFECC23-2F50-B199-E185-979564759D94}"/>
-              </a:ext>
-            </a:extLst>
-          </p:cNvPr>
-          <p:cNvSpPr>
-            <a:spLocks noGrp="1"/>
-          </p:cNvSpPr>
-          <p:nvPr>
-            <p:ph type="title"/>
-          </p:nvPr>
-        </p:nvSpPr>
-        <p:spPr/>
-        <p:txBody>
-          <a:bodyPr/>
-          <a:lstStyle/>
-          <a:p>
-            <a:endParaRPr lang="en-GB"/>
-          </a:p>
-        </p:txBody>
-      </p:sp>
-      <p:sp>
-        <p:nvSpPr>
-          <p:cNvPr id="3" name="Content Placeholder 2">
-            <a:extLst>
-              <a:ext uri="{FF2B5EF4-FFF2-40B4-BE49-F238E27FC236}">
-                <a16:creationId xmlns:a16="http://schemas.microsoft.com/office/drawing/2014/main" id="{57FA6F98-DE53-6B32-6984-5D450E68702B}"/>
-              </a:ext>
-            </a:extLst>
-          </p:cNvPr>
-          <p:cNvSpPr>
-            <a:spLocks noGrp="1"/>
-          </p:cNvSpPr>
-          <p:nvPr>
-            <p:ph idx="1"/>
-          </p:nvPr>
-        </p:nvSpPr>
-        <p:spPr/>
-        <p:txBody>
-          <a:bodyPr/>
-          <a:lstStyle/>
-          <a:p>
-            <a:endParaRPr lang="en-GB"/>
-          </a:p>
-        </p:txBody>
-      </p:sp>
-    </p:spTree>
-    <p:extLst>
-      <p:ext uri="{BB962C8B-B14F-4D97-AF65-F5344CB8AC3E}">
-        <p14:creationId xmlns:p14="http://schemas.microsoft.com/office/powerpoint/2010/main" val="3287728484"/>
-      </p:ext>
-    </p:extLst>
-  </p:cSld>
-  <p:clrMapOvr>
-    <a:masterClrMapping/>
-  </p:clrMapOvr>
-</p:sld>
-</file>
-
-<file path=ppt/slides/slide14.xml><?xml version="1.0" encoding="utf-8"?>
-<p:sld xmlns:a="http://schemas.openxmlformats.org/drawingml/2006/main" xmlns:r="http://schemas.openxmlformats.org/officeDocument/2006/relationships" xmlns:p="http://schemas.openxmlformats.org/presentationml/2006/main">
-  <p:cSld>
-    <p:spTree>
-      <p:nvGrpSpPr>
-        <p:cNvPr id="1" name=""/>
-        <p:cNvGrpSpPr/>
-        <p:nvPr/>
-      </p:nvGrpSpPr>
-      <p:grpSpPr>
-        <a:xfrm>
-          <a:off x="0" y="0"/>
-          <a:ext cx="0" cy="0"/>
-          <a:chOff x="0" y="0"/>
-          <a:chExt cx="0" cy="0"/>
-        </a:xfrm>
-      </p:grpSpPr>
-      <p:sp>
-        <p:nvSpPr>
-          <p:cNvPr id="2" name="Title 1">
-            <a:extLst>
-              <a:ext uri="{FF2B5EF4-FFF2-40B4-BE49-F238E27FC236}">
-                <a16:creationId xmlns:a16="http://schemas.microsoft.com/office/drawing/2014/main" id="{1611E0C6-2EF3-6B4B-54BB-2ECA2984C7EB}"/>
-              </a:ext>
-            </a:extLst>
-          </p:cNvPr>
-          <p:cNvSpPr>
-            <a:spLocks noGrp="1"/>
-          </p:cNvSpPr>
-          <p:nvPr>
-            <p:ph type="title"/>
-          </p:nvPr>
-        </p:nvSpPr>
-        <p:spPr/>
-        <p:txBody>
-          <a:bodyPr/>
-          <a:lstStyle/>
-          <a:p>
-            <a:endParaRPr lang="en-GB"/>
-          </a:p>
-        </p:txBody>
-      </p:sp>
-      <p:sp>
-        <p:nvSpPr>
-          <p:cNvPr id="3" name="Content Placeholder 2">
-            <a:extLst>
-              <a:ext uri="{FF2B5EF4-FFF2-40B4-BE49-F238E27FC236}">
-                <a16:creationId xmlns:a16="http://schemas.microsoft.com/office/drawing/2014/main" id="{AB37C5BE-B9E2-E989-DA86-9E9B7397D720}"/>
-              </a:ext>
-            </a:extLst>
-          </p:cNvPr>
-          <p:cNvSpPr>
-            <a:spLocks noGrp="1"/>
-          </p:cNvSpPr>
-          <p:nvPr>
-            <p:ph idx="1"/>
-          </p:nvPr>
-        </p:nvSpPr>
-        <p:spPr/>
-        <p:txBody>
-          <a:bodyPr/>
-          <a:lstStyle/>
-          <a:p>
-            <a:endParaRPr lang="en-GB"/>
-          </a:p>
-        </p:txBody>
-      </p:sp>
-    </p:spTree>
-    <p:extLst>
-      <p:ext uri="{BB962C8B-B14F-4D97-AF65-F5344CB8AC3E}">
-        <p14:creationId xmlns:p14="http://schemas.microsoft.com/office/powerpoint/2010/main" val="3303939963"/>
-      </p:ext>
-    </p:extLst>
-  </p:cSld>
-  <p:clrMapOvr>
-    <a:masterClrMapping/>
-  </p:clrMapOvr>
-</p:sld>
-</file>
-
-<file path=ppt/slides/slide15.xml><?xml version="1.0" encoding="utf-8"?>
-<p:sld xmlns:a="http://schemas.openxmlformats.org/drawingml/2006/main" xmlns:r="http://schemas.openxmlformats.org/officeDocument/2006/relationships" xmlns:p="http://schemas.openxmlformats.org/presentationml/2006/main">
-  <p:cSld>
-    <p:spTree>
-      <p:nvGrpSpPr>
-        <p:cNvPr id="1" name=""/>
-        <p:cNvGrpSpPr/>
-        <p:nvPr/>
-      </p:nvGrpSpPr>
-      <p:grpSpPr>
-        <a:xfrm>
-          <a:off x="0" y="0"/>
-          <a:ext cx="0" cy="0"/>
-          <a:chOff x="0" y="0"/>
-          <a:chExt cx="0" cy="0"/>
-        </a:xfrm>
-      </p:grpSpPr>
-      <p:sp>
-        <p:nvSpPr>
-          <p:cNvPr id="2" name="Title 1">
-            <a:extLst>
-              <a:ext uri="{FF2B5EF4-FFF2-40B4-BE49-F238E27FC236}">
-                <a16:creationId xmlns:a16="http://schemas.microsoft.com/office/drawing/2014/main" id="{8F85E553-2FE7-56AD-4566-A8EB1CA40470}"/>
-              </a:ext>
-            </a:extLst>
-          </p:cNvPr>
-          <p:cNvSpPr>
-            <a:spLocks noGrp="1"/>
-          </p:cNvSpPr>
-          <p:nvPr>
-            <p:ph type="title"/>
-          </p:nvPr>
-        </p:nvSpPr>
-        <p:spPr/>
-        <p:txBody>
-          <a:bodyPr/>
-          <a:lstStyle/>
-          <a:p>
-            <a:endParaRPr lang="en-GB"/>
-          </a:p>
-        </p:txBody>
-      </p:sp>
-      <p:sp>
-        <p:nvSpPr>
-          <p:cNvPr id="3" name="Content Placeholder 2">
-            <a:extLst>
-              <a:ext uri="{FF2B5EF4-FFF2-40B4-BE49-F238E27FC236}">
-                <a16:creationId xmlns:a16="http://schemas.microsoft.com/office/drawing/2014/main" id="{D0BF8A57-2D6D-460F-B4A7-BBE933E5D493}"/>
-              </a:ext>
-            </a:extLst>
-          </p:cNvPr>
-          <p:cNvSpPr>
-            <a:spLocks noGrp="1"/>
-          </p:cNvSpPr>
-          <p:nvPr>
-            <p:ph idx="1"/>
-          </p:nvPr>
-        </p:nvSpPr>
-        <p:spPr/>
-        <p:txBody>
-          <a:bodyPr/>
-          <a:lstStyle/>
-          <a:p>
-            <a:endParaRPr lang="en-GB"/>
-          </a:p>
-        </p:txBody>
-      </p:sp>
-    </p:spTree>
-    <p:extLst>
-      <p:ext uri="{BB962C8B-B14F-4D97-AF65-F5344CB8AC3E}">
-        <p14:creationId xmlns:p14="http://schemas.microsoft.com/office/powerpoint/2010/main" val="2716964551"/>
-      </p:ext>
-    </p:extLst>
-  </p:cSld>
-  <p:clrMapOvr>
-    <a:masterClrMapping/>
-  </p:clrMapOvr>
-</p:sld>
-</file>
-
-<file path=ppt/slides/slide16.xml><?xml version="1.0" encoding="utf-8"?>
-<p:sld xmlns:a="http://schemas.openxmlformats.org/drawingml/2006/main" xmlns:r="http://schemas.openxmlformats.org/officeDocument/2006/relationships" xmlns:p="http://schemas.openxmlformats.org/presentationml/2006/main">
-  <p:cSld>
-    <p:spTree>
-      <p:nvGrpSpPr>
-        <p:cNvPr id="1" name=""/>
-        <p:cNvGrpSpPr/>
-        <p:nvPr/>
-      </p:nvGrpSpPr>
-      <p:grpSpPr>
-        <a:xfrm>
-          <a:off x="0" y="0"/>
-          <a:ext cx="0" cy="0"/>
-          <a:chOff x="0" y="0"/>
-          <a:chExt cx="0" cy="0"/>
-        </a:xfrm>
-      </p:grpSpPr>
-      <p:sp>
-        <p:nvSpPr>
-          <p:cNvPr id="2" name="Title 1">
-            <a:extLst>
-              <a:ext uri="{FF2B5EF4-FFF2-40B4-BE49-F238E27FC236}">
-                <a16:creationId xmlns:a16="http://schemas.microsoft.com/office/drawing/2014/main" id="{72C23840-0DED-E75F-4FA0-A236CFED42E2}"/>
-              </a:ext>
-            </a:extLst>
-          </p:cNvPr>
-          <p:cNvSpPr>
-            <a:spLocks noGrp="1"/>
-          </p:cNvSpPr>
-          <p:nvPr>
-            <p:ph type="title"/>
-          </p:nvPr>
-        </p:nvSpPr>
-        <p:spPr/>
-        <p:txBody>
-          <a:bodyPr/>
-          <a:lstStyle/>
-          <a:p>
-            <a:endParaRPr lang="en-GB"/>
-          </a:p>
-        </p:txBody>
-      </p:sp>
-      <p:sp>
-        <p:nvSpPr>
-          <p:cNvPr id="3" name="Content Placeholder 2">
-            <a:extLst>
-              <a:ext uri="{FF2B5EF4-FFF2-40B4-BE49-F238E27FC236}">
-                <a16:creationId xmlns:a16="http://schemas.microsoft.com/office/drawing/2014/main" id="{58272B16-2E34-B55D-A383-49E60A753149}"/>
-              </a:ext>
-            </a:extLst>
-          </p:cNvPr>
-          <p:cNvSpPr>
-            <a:spLocks noGrp="1"/>
-          </p:cNvSpPr>
-          <p:nvPr>
-            <p:ph idx="1"/>
-          </p:nvPr>
-        </p:nvSpPr>
-        <p:spPr/>
-        <p:txBody>
-          <a:bodyPr/>
-          <a:lstStyle/>
-          <a:p>
-            <a:endParaRPr lang="en-GB"/>
-          </a:p>
-        </p:txBody>
-      </p:sp>
-    </p:spTree>
-    <p:extLst>
-      <p:ext uri="{BB962C8B-B14F-4D97-AF65-F5344CB8AC3E}">
-        <p14:creationId xmlns:p14="http://schemas.microsoft.com/office/powerpoint/2010/main" val="2611943468"/>
       </p:ext>
     </p:extLst>
   </p:cSld>
@@ -4177,29 +3698,15 @@
         </p:nvSpPr>
         <p:spPr>
           <a:xfrm>
-            <a:off x="838200" y="1376814"/>
-            <a:ext cx="10515600" cy="4351338"/>
+            <a:off x="128453" y="1139066"/>
+            <a:ext cx="6521468" cy="5131106"/>
           </a:xfrm>
         </p:spPr>
         <p:txBody>
           <a:bodyPr>
-            <a:normAutofit fontScale="92500" lnSpcReduction="20000"/>
+            <a:normAutofit fontScale="92500" lnSpcReduction="10000"/>
           </a:bodyPr>
           <a:lstStyle/>
-          <a:p>
-            <a:pPr algn="l"/>
-            <a:r>
-              <a:rPr lang="en-GB" dirty="0"/>
-              <a:t>Title: Introduction</a:t>
-            </a:r>
-          </a:p>
-          <a:p>
-            <a:pPr algn="l"/>
-            <a:r>
-              <a:rPr lang="en-GB" dirty="0"/>
-              <a:t>Content:</a:t>
-            </a:r>
-          </a:p>
           <a:p>
             <a:pPr algn="l">
               <a:buFont typeface="+mj-lt"/>
@@ -4211,20 +3718,14 @@
             </a:r>
           </a:p>
           <a:p>
-            <a:pPr marL="742950" lvl="1" indent="-285750" algn="l">
-              <a:buFont typeface="+mj-lt"/>
-              <a:buAutoNum type="arabicPeriod"/>
-            </a:pPr>
+            <a:pPr lvl="1"/>
             <a:r>
               <a:rPr lang="en-GB" dirty="0"/>
               <a:t>Analyse shipment data: Identify patterns and predict potential delays.</a:t>
             </a:r>
           </a:p>
           <a:p>
-            <a:pPr marL="742950" lvl="1" indent="-285750" algn="l">
-              <a:buFont typeface="+mj-lt"/>
-              <a:buAutoNum type="arabicPeriod"/>
-            </a:pPr>
+            <a:pPr lvl="1"/>
             <a:r>
               <a:rPr lang="en-GB" dirty="0"/>
               <a:t>Improve delivery performance: Enhance on-time delivery rates and optimize logistics.</a:t>
@@ -4241,30 +3742,21 @@
             </a:r>
           </a:p>
           <a:p>
-            <a:pPr marL="742950" lvl="1" indent="-285750" algn="l">
-              <a:buFont typeface="+mj-lt"/>
-              <a:buAutoNum type="arabicPeriod"/>
-            </a:pPr>
+            <a:pPr lvl="1"/>
             <a:r>
               <a:rPr lang="en-GB" dirty="0"/>
               <a:t>Customer Satisfaction: Timely deliveries are crucial for maintaining customer trust and satisfaction.</a:t>
             </a:r>
           </a:p>
           <a:p>
-            <a:pPr marL="742950" lvl="1" indent="-285750" algn="l">
-              <a:buFont typeface="+mj-lt"/>
-              <a:buAutoNum type="arabicPeriod"/>
-            </a:pPr>
+            <a:pPr lvl="1"/>
             <a:r>
               <a:rPr lang="en-GB" dirty="0"/>
               <a:t>Operational Efficiency: Efficient shipment processes reduce costs and improve resource allocation.</a:t>
             </a:r>
           </a:p>
           <a:p>
-            <a:pPr marL="742950" lvl="1" indent="-285750" algn="l">
-              <a:buFont typeface="+mj-lt"/>
-              <a:buAutoNum type="arabicPeriod"/>
-            </a:pPr>
+            <a:pPr lvl="1"/>
             <a:r>
               <a:rPr lang="en-GB" dirty="0"/>
               <a:t>Competitive Advantage: Reliable delivery performance helps the company stay competitive in the market.</a:t>
@@ -4275,6 +3767,41 @@
           </a:p>
         </p:txBody>
       </p:sp>
+      <p:pic>
+        <p:nvPicPr>
+          <p:cNvPr id="5" name="Picture 4" descr="A map of the united kingdom&#10;&#10;Description automatically generated">
+            <a:extLst>
+              <a:ext uri="{FF2B5EF4-FFF2-40B4-BE49-F238E27FC236}">
+                <a16:creationId xmlns:a16="http://schemas.microsoft.com/office/drawing/2014/main" id="{8EDB7218-5A84-1B99-0CDE-3E0EFEFDEA0D}"/>
+              </a:ext>
+            </a:extLst>
+          </p:cNvPr>
+          <p:cNvPicPr>
+            <a:picLocks noChangeAspect="1"/>
+          </p:cNvPicPr>
+          <p:nvPr/>
+        </p:nvPicPr>
+        <p:blipFill rotWithShape="1">
+          <a:blip r:embed="rId2">
+            <a:extLst>
+              <a:ext uri="{28A0092B-C50C-407E-A947-70E740481C1C}">
+                <a14:useLocalDpi xmlns:a14="http://schemas.microsoft.com/office/drawing/2010/main" val="0"/>
+              </a:ext>
+            </a:extLst>
+          </a:blip>
+          <a:srcRect l="9772" r="20377"/>
+          <a:stretch/>
+        </p:blipFill>
+        <p:spPr>
+          <a:xfrm>
+            <a:off x="6649920" y="688611"/>
+            <a:ext cx="5413628" cy="5804263"/>
+          </a:xfrm>
+          <a:prstGeom prst="rect">
+            <a:avLst/>
+          </a:prstGeom>
+        </p:spPr>
+      </p:pic>
     </p:spTree>
     <p:extLst>
       <p:ext uri="{BB962C8B-B14F-4D97-AF65-F5344CB8AC3E}">
@@ -4510,7 +4037,7 @@
         </p:nvSpPr>
         <p:spPr>
           <a:xfrm>
-            <a:off x="745921" y="1305508"/>
+            <a:off x="603308" y="1494261"/>
             <a:ext cx="10515600" cy="4351338"/>
           </a:xfrm>
         </p:spPr>
@@ -4530,20 +4057,14 @@
             </a:r>
           </a:p>
           <a:p>
-            <a:pPr marL="742950" lvl="1" indent="-285750" algn="l">
-              <a:buFont typeface="+mj-lt"/>
-              <a:buAutoNum type="arabicPeriod"/>
-            </a:pPr>
+            <a:pPr lvl="1"/>
             <a:r>
               <a:rPr lang="en-GB" dirty="0"/>
               <a:t>Data Sources: Shipment booking data and GPS tracking data.</a:t>
             </a:r>
           </a:p>
           <a:p>
-            <a:pPr marL="742950" lvl="1" indent="-285750" algn="l">
-              <a:buFont typeface="+mj-lt"/>
-              <a:buAutoNum type="arabicPeriod"/>
-            </a:pPr>
+            <a:pPr lvl="1"/>
             <a:r>
               <a:rPr lang="en-GB" dirty="0"/>
               <a:t>Integration: Combined static shipment data with real-time GPS data.</a:t>
@@ -4560,49 +4081,24 @@
             </a:r>
           </a:p>
           <a:p>
-            <a:pPr marL="742950" lvl="1" indent="-285750" algn="l">
-              <a:buFont typeface="+mj-lt"/>
-              <a:buAutoNum type="arabicPeriod"/>
-            </a:pPr>
-            <a:r>
-              <a:rPr lang="en-GB" dirty="0"/>
-              <a:t>Python: Used for data analysis and </a:t>
-            </a:r>
-            <a:r>
-              <a:rPr lang="en-GB" dirty="0" err="1"/>
-              <a:t>modeling</a:t>
-            </a:r>
-            <a:r>
-              <a:rPr lang="en-GB" dirty="0"/>
-              <a:t>. Allows efficient data handling and manipulation.</a:t>
-            </a:r>
-          </a:p>
-          <a:p>
-            <a:pPr marL="742950" lvl="1" indent="-285750" algn="l">
-              <a:buFont typeface="+mj-lt"/>
-              <a:buAutoNum type="arabicPeriod"/>
-            </a:pPr>
-            <a:r>
-              <a:rPr lang="en-GB" dirty="0"/>
-              <a:t>Pandas: A powerful data organization tool that helps clean, structure, and </a:t>
-            </a:r>
-            <a:r>
-              <a:rPr lang="en-GB" dirty="0" err="1"/>
-              <a:t>analyze</a:t>
-            </a:r>
-            <a:r>
-              <a:rPr lang="en-GB" dirty="0"/>
-              <a:t> data.</a:t>
-            </a:r>
-          </a:p>
-          <a:p>
-            <a:pPr marL="742950" lvl="1" indent="-285750" algn="l">
-              <a:buFont typeface="+mj-lt"/>
-              <a:buAutoNum type="arabicPeriod"/>
-            </a:pPr>
-            <a:r>
-              <a:rPr lang="en-GB" dirty="0"/>
-              <a:t>Google Maps API: Provides real-time traffic analysis and estimated travel times.</a:t>
+            <a:pPr lvl="1"/>
+            <a:r>
+              <a:rPr lang="en-GB" dirty="0"/>
+              <a:t>Python: Used for data analysis and modelling. Allows efficient data handling and manipulation.</a:t>
+            </a:r>
+          </a:p>
+          <a:p>
+            <a:pPr lvl="1"/>
+            <a:r>
+              <a:rPr lang="en-GB" dirty="0"/>
+              <a:t>Pandas: A powerful data organization tool that helps clean, structure, and analyse data.</a:t>
+            </a:r>
+          </a:p>
+          <a:p>
+            <a:pPr lvl="1"/>
+            <a:r>
+              <a:rPr lang="en-GB" dirty="0"/>
+              <a:t>Google Maps API: Provides real-time traffic analysis and estimated travel distance.</a:t>
             </a:r>
           </a:p>
           <a:p>
@@ -4616,41 +4112,24 @@
             </a:r>
           </a:p>
           <a:p>
-            <a:pPr marL="742950" lvl="1" indent="-285750" algn="l">
-              <a:buFont typeface="+mj-lt"/>
-              <a:buAutoNum type="arabicPeriod"/>
-            </a:pPr>
+            <a:pPr lvl="1"/>
             <a:r>
               <a:rPr lang="en-GB" dirty="0"/>
               <a:t>Data Cleaning: Removing inconsistencies and ensuring data quality.</a:t>
             </a:r>
           </a:p>
           <a:p>
-            <a:pPr marL="742950" lvl="1" indent="-285750" algn="l">
-              <a:buFont typeface="+mj-lt"/>
-              <a:buAutoNum type="arabicPeriod"/>
-            </a:pPr>
+            <a:pPr lvl="1"/>
             <a:r>
               <a:rPr lang="en-GB" dirty="0"/>
               <a:t>Feature Engineering: Creating meaningful features from raw data (e.g., travel distance, number of route segments).</a:t>
             </a:r>
           </a:p>
           <a:p>
-            <a:pPr marL="742950" lvl="1" indent="-285750" algn="l">
-              <a:buFont typeface="+mj-lt"/>
-              <a:buAutoNum type="arabicPeriod"/>
-            </a:pPr>
-            <a:r>
-              <a:rPr lang="en-GB" dirty="0"/>
-              <a:t>Predictive </a:t>
-            </a:r>
-            <a:r>
-              <a:rPr lang="en-GB" dirty="0" err="1"/>
-              <a:t>Modeling</a:t>
-            </a:r>
-            <a:r>
-              <a:rPr lang="en-GB" dirty="0"/>
-              <a:t>: Using historical data to train models that forecast potential delays.</a:t>
+            <a:pPr lvl="1"/>
+            <a:r>
+              <a:rPr lang="en-GB" dirty="0"/>
+              <a:t>Predictive Modelling: Using historical data to train models that forecast potential delays.</a:t>
             </a:r>
           </a:p>
           <a:p>
@@ -4736,10 +4215,15 @@
             <p:ph idx="1"/>
           </p:nvPr>
         </p:nvSpPr>
-        <p:spPr/>
+        <p:spPr>
+          <a:xfrm>
+            <a:off x="162887" y="1253331"/>
+            <a:ext cx="6850310" cy="4351338"/>
+          </a:xfrm>
+        </p:spPr>
         <p:txBody>
           <a:bodyPr>
-            <a:normAutofit fontScale="92500" lnSpcReduction="20000"/>
+            <a:normAutofit fontScale="92500" lnSpcReduction="10000"/>
           </a:bodyPr>
           <a:lstStyle/>
           <a:p>
@@ -4753,23 +4237,10 @@
             </a:r>
           </a:p>
           <a:p>
-            <a:pPr marL="742950" lvl="1" indent="-285750" algn="l">
-              <a:buFont typeface="+mj-lt"/>
-              <a:buAutoNum type="arabicPeriod"/>
-            </a:pPr>
-            <a:r>
-              <a:rPr lang="en-GB" dirty="0"/>
-              <a:t>Percentage of On-Time Shipments:</a:t>
-            </a:r>
-          </a:p>
-          <a:p>
-            <a:pPr marL="1143000" lvl="2" indent="-228600" algn="l">
-              <a:buFont typeface="+mj-lt"/>
-              <a:buAutoNum type="arabicPeriod"/>
-            </a:pPr>
-            <a:r>
-              <a:rPr lang="en-GB" dirty="0"/>
-              <a:t>X% of shipments were delivered within the scheduled time frames.</a:t>
+            <a:pPr lvl="1"/>
+            <a:r>
+              <a:rPr lang="en-GB" dirty="0"/>
+              <a:t>Only 62.6% of shipments were delivered within the scheduled time frames.</a:t>
             </a:r>
           </a:p>
           <a:p>
@@ -4783,54 +4254,15 @@
             </a:r>
           </a:p>
           <a:p>
-            <a:pPr marL="742950" lvl="1" indent="-285750" algn="l">
-              <a:buFont typeface="+mj-lt"/>
-              <a:buAutoNum type="arabicPeriod"/>
-            </a:pPr>
-            <a:r>
-              <a:rPr lang="en-GB" dirty="0"/>
-              <a:t>Common Factors:</a:t>
-            </a:r>
-          </a:p>
-          <a:p>
-            <a:pPr marL="1143000" lvl="2" indent="-228600" algn="l">
-              <a:buFont typeface="+mj-lt"/>
-              <a:buAutoNum type="arabicPeriod"/>
-            </a:pPr>
-            <a:r>
-              <a:rPr lang="en-GB" dirty="0"/>
-              <a:t>Traffic congestion.</a:t>
-            </a:r>
-          </a:p>
-          <a:p>
-            <a:pPr marL="1143000" lvl="2" indent="-228600" algn="l">
-              <a:buFont typeface="+mj-lt"/>
-              <a:buAutoNum type="arabicPeriod"/>
-            </a:pPr>
-            <a:r>
-              <a:rPr lang="en-GB" dirty="0"/>
-              <a:t>Weather conditions.</a:t>
-            </a:r>
-          </a:p>
-          <a:p>
-            <a:pPr marL="1143000" lvl="2" indent="-228600" algn="l">
-              <a:buFont typeface="+mj-lt"/>
-              <a:buAutoNum type="arabicPeriod"/>
-            </a:pPr>
-            <a:r>
-              <a:rPr lang="en-GB" dirty="0"/>
-              <a:t>Route distance and complexity.</a:t>
-            </a:r>
-          </a:p>
-          <a:p>
-            <a:pPr marL="1143000" lvl="2" indent="-228600" algn="l">
-              <a:buFont typeface="+mj-lt"/>
-              <a:buAutoNum type="arabicPeriod"/>
-            </a:pPr>
-            <a:r>
-              <a:rPr lang="en-GB" dirty="0"/>
-              <a:t>Vehicle-related issues.</a:t>
-            </a:r>
+            <a:pPr lvl="1"/>
+            <a:r>
+              <a:rPr lang="en-GB" dirty="0"/>
+              <a:t>Vehicle type, distance, if ferry is on route, delivery and collection postcode, complexity of the route</a:t>
+            </a:r>
+          </a:p>
+          <a:p>
+            <a:pPr lvl="2"/>
+            <a:endParaRPr lang="en-GB" dirty="0"/>
           </a:p>
           <a:p>
             <a:pPr algn="l">
@@ -4843,43 +4275,17 @@
             </a:r>
           </a:p>
           <a:p>
-            <a:pPr marL="742950" lvl="1" indent="-285750" algn="l">
-              <a:buFont typeface="+mj-lt"/>
-              <a:buAutoNum type="arabicPeriod"/>
-            </a:pPr>
-            <a:r>
-              <a:rPr lang="en-GB" dirty="0"/>
-              <a:t>Identified Patterns:</a:t>
-            </a:r>
-          </a:p>
-          <a:p>
-            <a:pPr marL="1143000" lvl="2" indent="-228600" algn="l">
-              <a:buFont typeface="+mj-lt"/>
-              <a:buAutoNum type="arabicPeriod"/>
-            </a:pPr>
-            <a:r>
-              <a:rPr lang="en-GB" dirty="0"/>
-              <a:t>Specific routes with higher delay rates.</a:t>
-            </a:r>
-          </a:p>
-          <a:p>
-            <a:pPr marL="1143000" lvl="2" indent="-228600" algn="l">
-              <a:buFont typeface="+mj-lt"/>
-              <a:buAutoNum type="arabicPeriod"/>
-            </a:pPr>
-            <a:r>
-              <a:rPr lang="en-GB" dirty="0"/>
-              <a:t>Times of day or days of the week prone to delays.</a:t>
-            </a:r>
-          </a:p>
-          <a:p>
-            <a:pPr marL="1143000" lvl="2" indent="-228600" algn="l">
-              <a:buFont typeface="+mj-lt"/>
-              <a:buAutoNum type="arabicPeriod"/>
-            </a:pPr>
-            <a:r>
-              <a:rPr lang="en-GB" dirty="0"/>
-              <a:t>Correlation between vehicle type and delay likelihood.</a:t>
+            <a:pPr lvl="1"/>
+            <a:r>
+              <a:rPr lang="en-GB" dirty="0"/>
+              <a:t>Vehicle type (e.g. 18T Rigid and 7.5T Rigid are likely to be delayed)</a:t>
+            </a:r>
+          </a:p>
+          <a:p>
+            <a:pPr lvl="1"/>
+            <a:r>
+              <a:rPr lang="en-GB" dirty="0"/>
+              <a:t>Distance delivery are more on average more likely to be delayed</a:t>
             </a:r>
           </a:p>
           <a:p>
@@ -4887,6 +4293,76 @@
           </a:p>
         </p:txBody>
       </p:sp>
+      <p:pic>
+        <p:nvPicPr>
+          <p:cNvPr id="7" name="Picture 6" descr="A graph with red and blue bars&#10;&#10;Description automatically generated">
+            <a:extLst>
+              <a:ext uri="{FF2B5EF4-FFF2-40B4-BE49-F238E27FC236}">
+                <a16:creationId xmlns:a16="http://schemas.microsoft.com/office/drawing/2014/main" id="{29BA65FC-599E-2AB6-1848-1AD5BC86C499}"/>
+              </a:ext>
+            </a:extLst>
+          </p:cNvPr>
+          <p:cNvPicPr>
+            <a:picLocks noChangeAspect="1"/>
+          </p:cNvPicPr>
+          <p:nvPr/>
+        </p:nvPicPr>
+        <p:blipFill rotWithShape="1">
+          <a:blip r:embed="rId2">
+            <a:extLst>
+              <a:ext uri="{28A0092B-C50C-407E-A947-70E740481C1C}">
+                <a14:useLocalDpi xmlns:a14="http://schemas.microsoft.com/office/drawing/2010/main" val="0"/>
+              </a:ext>
+            </a:extLst>
+          </a:blip>
+          <a:srcRect l="6256" t="8027" r="8919"/>
+          <a:stretch/>
+        </p:blipFill>
+        <p:spPr>
+          <a:xfrm>
+            <a:off x="7001011" y="100571"/>
+            <a:ext cx="5028102" cy="3180234"/>
+          </a:xfrm>
+          <a:prstGeom prst="rect">
+            <a:avLst/>
+          </a:prstGeom>
+        </p:spPr>
+      </p:pic>
+      <p:pic>
+        <p:nvPicPr>
+          <p:cNvPr id="9" name="Picture 8" descr="A box plot of disable distancing&#10;&#10;Description automatically generated">
+            <a:extLst>
+              <a:ext uri="{FF2B5EF4-FFF2-40B4-BE49-F238E27FC236}">
+                <a16:creationId xmlns:a16="http://schemas.microsoft.com/office/drawing/2014/main" id="{A61C70BC-E8E8-7351-7BD0-27E5CE9DEB36}"/>
+              </a:ext>
+            </a:extLst>
+          </p:cNvPr>
+          <p:cNvPicPr>
+            <a:picLocks noChangeAspect="1"/>
+          </p:cNvPicPr>
+          <p:nvPr/>
+        </p:nvPicPr>
+        <p:blipFill rotWithShape="1">
+          <a:blip r:embed="rId3">
+            <a:extLst>
+              <a:ext uri="{28A0092B-C50C-407E-A947-70E740481C1C}">
+                <a14:useLocalDpi xmlns:a14="http://schemas.microsoft.com/office/drawing/2010/main" val="0"/>
+              </a:ext>
+            </a:extLst>
+          </a:blip>
+          <a:srcRect l="3880" t="7607" r="6844"/>
+          <a:stretch/>
+        </p:blipFill>
+        <p:spPr>
+          <a:xfrm>
+            <a:off x="7524925" y="3545359"/>
+            <a:ext cx="4049436" cy="3143059"/>
+          </a:xfrm>
+          <a:prstGeom prst="rect">
+            <a:avLst/>
+          </a:prstGeom>
+        </p:spPr>
+      </p:pic>
     </p:spTree>
     <p:extLst>
       <p:ext uri="{BB962C8B-B14F-4D97-AF65-F5344CB8AC3E}">
@@ -4933,12 +4409,24 @@
             <p:ph type="title"/>
           </p:nvPr>
         </p:nvSpPr>
-        <p:spPr/>
-        <p:txBody>
-          <a:bodyPr/>
-          <a:lstStyle/>
-          <a:p>
-            <a:endParaRPr lang="en-GB"/>
+        <p:spPr>
+          <a:xfrm>
+            <a:off x="0" y="0"/>
+            <a:ext cx="10515600" cy="1325563"/>
+          </a:xfrm>
+        </p:spPr>
+        <p:txBody>
+          <a:bodyPr/>
+          <a:lstStyle/>
+          <a:p>
+            <a:r>
+              <a:rPr lang="en-GB" dirty="0"/>
+              <a:t>Key Findings</a:t>
+            </a:r>
+            <a:br>
+              <a:rPr lang="en-GB" dirty="0"/>
+            </a:br>
+            <a:endParaRPr lang="en-GB" dirty="0"/>
           </a:p>
         </p:txBody>
       </p:sp>
@@ -4958,36 +4446,58 @@
             <p:ph idx="1"/>
           </p:nvPr>
         </p:nvSpPr>
-        <p:spPr/>
-        <p:txBody>
-          <a:bodyPr/>
-          <a:lstStyle/>
-          <a:p>
-            <a:r>
-              <a:rPr lang="en-GB" dirty="0"/>
-              <a:t>Present the main findings:</a:t>
-            </a:r>
-          </a:p>
-          <a:p>
-            <a:r>
-              <a:rPr lang="en-GB" dirty="0"/>
-              <a:t>Percentage of shipments that were on-time.</a:t>
-            </a:r>
-          </a:p>
-          <a:p>
-            <a:r>
-              <a:rPr lang="en-GB" dirty="0"/>
-              <a:t>Common factors contributing to delays.</a:t>
-            </a:r>
-          </a:p>
-          <a:p>
-            <a:r>
-              <a:rPr lang="en-GB" dirty="0"/>
-              <a:t>Any patterns or trends identified (e.g., specific routes or times prone to delays).</a:t>
-            </a:r>
-          </a:p>
-        </p:txBody>
-      </p:sp>
+        <p:spPr>
+          <a:xfrm>
+            <a:off x="274857" y="983365"/>
+            <a:ext cx="10902193" cy="4351338"/>
+          </a:xfrm>
+        </p:spPr>
+        <p:txBody>
+          <a:bodyPr/>
+          <a:lstStyle/>
+          <a:p>
+            <a:r>
+              <a:rPr lang="en-GB" dirty="0"/>
+              <a:t>On average routes with more step counts (a simple measure of complexity of the route  measured in number of ‘turns’) are more likely to be delayed.</a:t>
+            </a:r>
+          </a:p>
+        </p:txBody>
+      </p:sp>
+      <p:pic>
+        <p:nvPicPr>
+          <p:cNvPr id="5" name="Picture 4" descr="A colorful graph of a city&#10;&#10;Description automatically generated with medium confidence">
+            <a:extLst>
+              <a:ext uri="{FF2B5EF4-FFF2-40B4-BE49-F238E27FC236}">
+                <a16:creationId xmlns:a16="http://schemas.microsoft.com/office/drawing/2014/main" id="{DC80A2D9-E7E7-DAE7-AFF1-621A1BFC9ED5}"/>
+              </a:ext>
+            </a:extLst>
+          </p:cNvPr>
+          <p:cNvPicPr>
+            <a:picLocks noChangeAspect="1"/>
+          </p:cNvPicPr>
+          <p:nvPr/>
+        </p:nvPicPr>
+        <p:blipFill rotWithShape="1">
+          <a:blip r:embed="rId2">
+            <a:extLst>
+              <a:ext uri="{28A0092B-C50C-407E-A947-70E740481C1C}">
+                <a14:useLocalDpi xmlns:a14="http://schemas.microsoft.com/office/drawing/2010/main" val="0"/>
+              </a:ext>
+            </a:extLst>
+          </a:blip>
+          <a:srcRect l="7072" r="8464"/>
+          <a:stretch/>
+        </p:blipFill>
+        <p:spPr>
+          <a:xfrm>
+            <a:off x="511177" y="2286000"/>
+            <a:ext cx="10297885" cy="4572000"/>
+          </a:xfrm>
+          <a:prstGeom prst="rect">
+            <a:avLst/>
+          </a:prstGeom>
+        </p:spPr>
+      </p:pic>
     </p:spTree>
     <p:extLst>
       <p:ext uri="{BB962C8B-B14F-4D97-AF65-F5344CB8AC3E}">
@@ -5023,7 +4533,7 @@
           <p:cNvPr id="2" name="Title 1">
             <a:extLst>
               <a:ext uri="{FF2B5EF4-FFF2-40B4-BE49-F238E27FC236}">
-                <a16:creationId xmlns:a16="http://schemas.microsoft.com/office/drawing/2014/main" id="{496D3270-BC43-18C4-2B2E-3CAEA0AE7E22}"/>
+                <a16:creationId xmlns:a16="http://schemas.microsoft.com/office/drawing/2014/main" id="{252FF2F1-C20D-D003-2AB0-74FDDBA4F303}"/>
               </a:ext>
             </a:extLst>
           </p:cNvPr>
@@ -5034,100 +4544,146 @@
             <p:ph type="title"/>
           </p:nvPr>
         </p:nvSpPr>
-        <p:spPr/>
-        <p:txBody>
-          <a:bodyPr/>
-          <a:lstStyle/>
-          <a:p>
+        <p:spPr>
+          <a:xfrm>
+            <a:off x="11884" y="50538"/>
+            <a:ext cx="10515600" cy="1325563"/>
+          </a:xfrm>
+        </p:spPr>
+        <p:txBody>
+          <a:bodyPr/>
+          <a:lstStyle/>
+          <a:p>
+            <a:r>
+              <a:rPr lang="en-GB" dirty="0"/>
+              <a:t>Key Findings</a:t>
+            </a:r>
             <a:br>
               <a:rPr lang="en-GB" dirty="0"/>
             </a:br>
-            <a:r>
-              <a:rPr lang="en-GB" dirty="0"/>
-              <a:t>Business Implications</a:t>
-            </a:r>
-          </a:p>
-        </p:txBody>
-      </p:sp>
-      <p:sp>
-        <p:nvSpPr>
-          <p:cNvPr id="3" name="Content Placeholder 2">
-            <a:extLst>
-              <a:ext uri="{FF2B5EF4-FFF2-40B4-BE49-F238E27FC236}">
-                <a16:creationId xmlns:a16="http://schemas.microsoft.com/office/drawing/2014/main" id="{CF5C3FEB-F19D-2F83-FB68-808F6DE123E1}"/>
-              </a:ext>
-            </a:extLst>
-          </p:cNvPr>
-          <p:cNvSpPr>
-            <a:spLocks noGrp="1"/>
-          </p:cNvSpPr>
+            <a:endParaRPr lang="en-GB" dirty="0"/>
+          </a:p>
+        </p:txBody>
+      </p:sp>
+      <p:sp>
+        <p:nvSpPr>
+          <p:cNvPr id="7" name="TextBox 6">
+            <a:extLst>
+              <a:ext uri="{FF2B5EF4-FFF2-40B4-BE49-F238E27FC236}">
+                <a16:creationId xmlns:a16="http://schemas.microsoft.com/office/drawing/2014/main" id="{C74B6E31-FE53-06B5-F67F-72BBF88084CE}"/>
+              </a:ext>
+            </a:extLst>
+          </p:cNvPr>
+          <p:cNvSpPr txBox="1"/>
+          <p:nvPr/>
+        </p:nvSpPr>
+        <p:spPr>
+          <a:xfrm>
+            <a:off x="300426" y="1191435"/>
+            <a:ext cx="9664243" cy="923330"/>
+          </a:xfrm>
+          <a:prstGeom prst="rect">
+            <a:avLst/>
+          </a:prstGeom>
+          <a:noFill/>
+        </p:spPr>
+        <p:txBody>
+          <a:bodyPr wrap="square">
+            <a:spAutoFit/>
+          </a:bodyPr>
+          <a:lstStyle/>
+          <a:p>
+            <a:r>
+              <a:rPr lang="en-GB" dirty="0"/>
+              <a:t>Certain delivery locations are more likely to be delayed.</a:t>
+            </a:r>
+          </a:p>
+          <a:p>
+            <a:r>
+              <a:rPr lang="en-GB" dirty="0"/>
+              <a:t>Similarly, some collection locations are associated with delayed.</a:t>
+            </a:r>
+          </a:p>
+          <a:p>
+            <a:endParaRPr lang="en-GB" dirty="0"/>
+          </a:p>
+        </p:txBody>
+      </p:sp>
+      <p:pic>
+        <p:nvPicPr>
+          <p:cNvPr id="13" name="Content Placeholder 12" descr="A diagram of red dots&#10;&#10;Description automatically generated">
+            <a:extLst>
+              <a:ext uri="{FF2B5EF4-FFF2-40B4-BE49-F238E27FC236}">
+                <a16:creationId xmlns:a16="http://schemas.microsoft.com/office/drawing/2014/main" id="{33A5D523-476D-5411-0927-8977E02B0746}"/>
+              </a:ext>
+            </a:extLst>
+          </p:cNvPr>
+          <p:cNvPicPr>
+            <a:picLocks noGrp="1" noChangeAspect="1"/>
+          </p:cNvPicPr>
           <p:nvPr>
             <p:ph idx="1"/>
           </p:nvPr>
-        </p:nvSpPr>
-        <p:spPr/>
-        <p:txBody>
-          <a:bodyPr>
-            <a:normAutofit fontScale="92500"/>
-          </a:bodyPr>
-          <a:lstStyle/>
-          <a:p>
-            <a:pPr algn="l"/>
-            <a:r>
-              <a:rPr lang="en-GB" dirty="0"/>
-              <a:t>Financial Implications:</a:t>
-            </a:r>
-          </a:p>
-          <a:p>
-            <a:pPr lvl="1"/>
-            <a:r>
-              <a:rPr lang="en-GB" dirty="0"/>
-              <a:t>Cost of Delays: Discuss the direct costs associated with delays, such as penalties, increased shipping costs, and potential loss of business.</a:t>
-            </a:r>
-          </a:p>
-          <a:p>
-            <a:pPr lvl="1"/>
-            <a:r>
-              <a:rPr lang="en-GB" dirty="0"/>
-              <a:t>Revenue Impact: Highlight how improving delivery times can increase revenue through better customer satisfaction and repeat business.</a:t>
-            </a:r>
-          </a:p>
-          <a:p>
-            <a:pPr lvl="1"/>
-            <a:r>
-              <a:rPr lang="en-GB" dirty="0"/>
-              <a:t>Long-Term Financial Health: Explain the correlation between efficient logistics, reduced operational costs, and improved profit margins.</a:t>
-            </a:r>
-          </a:p>
-          <a:p>
-            <a:r>
-              <a:rPr lang="en-GB" dirty="0"/>
-              <a:t>Risks Identified:</a:t>
-            </a:r>
-          </a:p>
-          <a:p>
-            <a:pPr lvl="1"/>
-            <a:r>
-              <a:rPr lang="en-GB" dirty="0"/>
-              <a:t>Operational Risks: Delays expose the company to operational risks including reduced efficiency and increased complexity in logistics management.</a:t>
-            </a:r>
-          </a:p>
-          <a:p>
-            <a:pPr lvl="1"/>
-            <a:r>
-              <a:rPr lang="en-GB" dirty="0"/>
-              <a:t>Market Risks: In competitive markets, failure to deliver on time can lead to a loss of market share as customers move to competitors.</a:t>
-            </a:r>
-          </a:p>
-          <a:p>
-            <a:endParaRPr lang="en-GB" dirty="0"/>
-          </a:p>
-        </p:txBody>
-      </p:sp>
+        </p:nvPicPr>
+        <p:blipFill>
+          <a:blip r:embed="rId2">
+            <a:extLst>
+              <a:ext uri="{28A0092B-C50C-407E-A947-70E740481C1C}">
+                <a14:useLocalDpi xmlns:a14="http://schemas.microsoft.com/office/drawing/2010/main" val="0"/>
+              </a:ext>
+            </a:extLst>
+          </a:blip>
+          <a:stretch>
+            <a:fillRect/>
+          </a:stretch>
+        </p:blipFill>
+        <p:spPr>
+          <a:xfrm>
+            <a:off x="11884" y="2597110"/>
+            <a:ext cx="5758808" cy="3839205"/>
+          </a:xfrm>
+        </p:spPr>
+      </p:pic>
+      <p:pic>
+        <p:nvPicPr>
+          <p:cNvPr id="15" name="Picture 14" descr="A graph with red dots&#10;&#10;Description automatically generated">
+            <a:extLst>
+              <a:ext uri="{FF2B5EF4-FFF2-40B4-BE49-F238E27FC236}">
+                <a16:creationId xmlns:a16="http://schemas.microsoft.com/office/drawing/2014/main" id="{02466D9B-54F3-24F7-9558-D1C24BF1AB05}"/>
+              </a:ext>
+            </a:extLst>
+          </p:cNvPr>
+          <p:cNvPicPr>
+            <a:picLocks noChangeAspect="1"/>
+          </p:cNvPicPr>
+          <p:nvPr/>
+        </p:nvPicPr>
+        <p:blipFill>
+          <a:blip r:embed="rId3">
+            <a:extLst>
+              <a:ext uri="{28A0092B-C50C-407E-A947-70E740481C1C}">
+                <a14:useLocalDpi xmlns:a14="http://schemas.microsoft.com/office/drawing/2010/main" val="0"/>
+              </a:ext>
+            </a:extLst>
+          </a:blip>
+          <a:stretch>
+            <a:fillRect/>
+          </a:stretch>
+        </p:blipFill>
+        <p:spPr>
+          <a:xfrm>
+            <a:off x="5891762" y="2451462"/>
+            <a:ext cx="6195755" cy="4130503"/>
+          </a:xfrm>
+          <a:prstGeom prst="rect">
+            <a:avLst/>
+          </a:prstGeom>
+        </p:spPr>
+      </p:pic>
     </p:spTree>
     <p:extLst>
       <p:ext uri="{BB962C8B-B14F-4D97-AF65-F5344CB8AC3E}">
-        <p14:creationId xmlns:p14="http://schemas.microsoft.com/office/powerpoint/2010/main" val="2925062801"/>
+        <p14:creationId xmlns:p14="http://schemas.microsoft.com/office/powerpoint/2010/main" val="3577855203"/>
       </p:ext>
     </p:extLst>
   </p:cSld>
@@ -5159,7 +4715,7 @@
           <p:cNvPr id="2" name="Title 1">
             <a:extLst>
               <a:ext uri="{FF2B5EF4-FFF2-40B4-BE49-F238E27FC236}">
-                <a16:creationId xmlns:a16="http://schemas.microsoft.com/office/drawing/2014/main" id="{F1E66AA3-8CDF-5C18-9BCC-2E7CC3B72C9C}"/>
+                <a16:creationId xmlns:a16="http://schemas.microsoft.com/office/drawing/2014/main" id="{496D3270-BC43-18C4-2B2E-3CAEA0AE7E22}"/>
               </a:ext>
             </a:extLst>
           </p:cNvPr>
@@ -5170,14 +4726,22 @@
             <p:ph type="title"/>
           </p:nvPr>
         </p:nvSpPr>
-        <p:spPr/>
-        <p:txBody>
-          <a:bodyPr/>
-          <a:lstStyle/>
-          <a:p>
-            <a:r>
-              <a:rPr lang="en-GB" dirty="0"/>
-              <a:t>Recommendations</a:t>
+        <p:spPr>
+          <a:xfrm>
+            <a:off x="54429" y="-109493"/>
+            <a:ext cx="10515600" cy="1325563"/>
+          </a:xfrm>
+        </p:spPr>
+        <p:txBody>
+          <a:bodyPr/>
+          <a:lstStyle/>
+          <a:p>
+            <a:br>
+              <a:rPr lang="en-GB" dirty="0"/>
+            </a:br>
+            <a:r>
+              <a:rPr lang="en-GB" dirty="0"/>
+              <a:t>Business Implications</a:t>
             </a:r>
           </a:p>
         </p:txBody>
@@ -5187,7 +4751,7 @@
           <p:cNvPr id="3" name="Content Placeholder 2">
             <a:extLst>
               <a:ext uri="{FF2B5EF4-FFF2-40B4-BE49-F238E27FC236}">
-                <a16:creationId xmlns:a16="http://schemas.microsoft.com/office/drawing/2014/main" id="{32EA900D-34BC-EDF1-D1C2-8E40FB3DDFA8}"/>
+                <a16:creationId xmlns:a16="http://schemas.microsoft.com/office/drawing/2014/main" id="{CF5C3FEB-F19D-2F83-FB68-808F6DE123E1}"/>
               </a:ext>
             </a:extLst>
           </p:cNvPr>
@@ -5198,36 +4762,49 @@
             <p:ph idx="1"/>
           </p:nvPr>
         </p:nvSpPr>
-        <p:spPr/>
-        <p:txBody>
-          <a:bodyPr/>
+        <p:spPr>
+          <a:xfrm>
+            <a:off x="594999" y="1629602"/>
+            <a:ext cx="10515600" cy="4351338"/>
+          </a:xfrm>
+        </p:spPr>
+        <p:txBody>
+          <a:bodyPr>
+            <a:normAutofit/>
+          </a:bodyPr>
           <a:lstStyle/>
           <a:p>
             <a:pPr algn="l"/>
             <a:r>
               <a:rPr lang="en-GB" dirty="0"/>
-              <a:t>Opportunities for Improvement:</a:t>
+              <a:t>Financial Implications:</a:t>
             </a:r>
           </a:p>
           <a:p>
             <a:pPr lvl="1"/>
             <a:r>
               <a:rPr lang="en-GB" dirty="0"/>
-              <a:t>Technology Adoption: Utilizing advanced predictive analytics and real-time tracking technologies to mitigate risks associated with unforeseen delays.</a:t>
+              <a:t>Cost of Delays: Discuss the direct costs associated with delays, such as penalties, increased shipping costs, and potential loss of business.</a:t>
             </a:r>
           </a:p>
           <a:p>
             <a:pPr lvl="1"/>
             <a:r>
               <a:rPr lang="en-GB" dirty="0"/>
-              <a:t>Process Optimization: Opportunities to refine logistical processes based on insights gained from the data analysis.</a:t>
+              <a:t>Revenue Impact: improving delivery times can increase revenue through better customer satisfaction and repeat business. Risks Identified:</a:t>
+            </a:r>
+          </a:p>
+          <a:p>
+            <a:r>
+              <a:rPr lang="en-GB" dirty="0"/>
+              <a:t>Operational Risks: </a:t>
             </a:r>
           </a:p>
           <a:p>
             <a:pPr lvl="1"/>
             <a:r>
               <a:rPr lang="en-GB" dirty="0"/>
-              <a:t>Strengthening Partnerships: Collaborating more closely with shipping and logistics partners to improve overall delivery timelines.</a:t>
+              <a:t>Market Risks: In competitive markets, failure to deliver on time can lead to a loss of market share as customers move to competitors.</a:t>
             </a:r>
           </a:p>
           <a:p>
@@ -5238,7 +4815,7 @@
     </p:spTree>
     <p:extLst>
       <p:ext uri="{BB962C8B-B14F-4D97-AF65-F5344CB8AC3E}">
-        <p14:creationId xmlns:p14="http://schemas.microsoft.com/office/powerpoint/2010/main" val="866203643"/>
+        <p14:creationId xmlns:p14="http://schemas.microsoft.com/office/powerpoint/2010/main" val="2925062801"/>
       </p:ext>
     </p:extLst>
   </p:cSld>
@@ -5281,7 +4858,12 @@
             <p:ph type="title"/>
           </p:nvPr>
         </p:nvSpPr>
-        <p:spPr/>
+        <p:spPr>
+          <a:xfrm>
+            <a:off x="20273" y="18255"/>
+            <a:ext cx="10515600" cy="1325563"/>
+          </a:xfrm>
+        </p:spPr>
         <p:txBody>
           <a:bodyPr/>
           <a:lstStyle/>
@@ -5340,13 +4922,6 @@
             <a:pPr lvl="1"/>
             <a:r>
               <a:rPr lang="en-GB" dirty="0"/>
-              <a:t>Predictive Analytics Expansion: Utilize advanced machine learning models that can factor in a broader range of variables, such as weather conditions, traffic patterns, and carrier performance history.</a:t>
-            </a:r>
-          </a:p>
-          <a:p>
-            <a:pPr lvl="1"/>
-            <a:r>
-              <a:rPr lang="en-GB" dirty="0"/>
               <a:t>Real-Time Data Integration: </a:t>
             </a:r>
             <a:r>
@@ -5355,7 +4930,14 @@
             </a:r>
             <a:r>
               <a:rPr lang="en-GB" dirty="0"/>
-              <a:t> the impact of integrating real-time data feeds into the prediction model, such as traffic updates, weather forecasts, and real-time vehicle tracking.</a:t>
+              <a:t> the impact of integrating real-time data feeds into the prediction model, such as traffic updates, weather forecasts, and real-time vehicle tracking. Utilize advanced machine learning models that can factor in a broader range of variables,.</a:t>
+            </a:r>
+          </a:p>
+          <a:p>
+            <a:pPr lvl="1"/>
+            <a:r>
+              <a:rPr lang="en-GB" dirty="0"/>
+              <a:t>Advanced analytics : E.g. apply a multitasking model that can predict likelihood of delay as well length of delay</a:t>
             </a:r>
           </a:p>
           <a:p>

</xml_diff>